<commit_message>
Added two copies of the ppt slides where one has no annotations, minor font color edits
</commit_message>
<xml_diff>
--- a/FYP CA Presentation.pptx
+++ b/FYP CA Presentation.pptx
@@ -550,46 +550,12 @@
           <a:lstStyle/>
           <a:p>
             <a:r>
-              <a:rPr lang="en-US" dirty="0" smtClean="0"/>
-              <a:t>CTS-medical</a:t>
-            </a:r>
-            <a:r>
               <a:rPr lang="en-US" baseline="0" dirty="0" smtClean="0"/>
-              <a:t> : </a:t>
-            </a:r>
-            <a:r>
-              <a:rPr lang="en-US" dirty="0" smtClean="0"/>
-              <a:t>CTS causes pain to the user.</a:t>
-            </a:r>
-          </a:p>
-          <a:p>
-            <a:r>
-              <a:rPr lang="en-US" dirty="0" smtClean="0"/>
-              <a:t>Programmers-type</a:t>
+              <a:t>[</a:t>
             </a:r>
             <a:r>
               <a:rPr lang="en-US" baseline="0" dirty="0" smtClean="0"/>
-              <a:t> : </a:t>
-            </a:r>
-            <a:r>
-              <a:rPr lang="en-US" dirty="0" smtClean="0"/>
-              <a:t>This</a:t>
-            </a:r>
-            <a:r>
-              <a:rPr lang="en-US" baseline="0" dirty="0" smtClean="0"/>
-              <a:t> affects programmers the most, as they are required to perform repetitive tasks like typing code for a long period of time.</a:t>
-            </a:r>
-          </a:p>
-          <a:p>
-            <a:r>
-              <a:rPr lang="en-US" baseline="0" dirty="0" smtClean="0"/>
-              <a:t>Assist-programmers: Programmers not suffering from CTS will not contract it and programmers suffering from CTS are able to write code once again.</a:t>
-            </a:r>
-          </a:p>
-          <a:p>
-            <a:r>
-              <a:rPr lang="en-US" baseline="0" dirty="0" smtClean="0"/>
-              <a:t>[Credit] </a:t>
+              <a:t>Credit] </a:t>
             </a:r>
             <a:r>
               <a:rPr lang="en-US" sz="1200" b="0" i="0" u="none" strike="noStrike" kern="1200" dirty="0" smtClean="0">
@@ -726,26 +692,6 @@
           <a:bodyPr/>
           <a:lstStyle/>
           <a:p>
-            <a:r>
-              <a:rPr lang="en-US" dirty="0" smtClean="0"/>
-              <a:t>Natural and</a:t>
-            </a:r>
-            <a:r>
-              <a:rPr lang="en-US" baseline="0" dirty="0" smtClean="0"/>
-              <a:t> common for programmers to speak in high level code instead of low level constructs, this is in spite of them being asked to verbalize program code and not paraphrase visible patterns.</a:t>
-            </a:r>
-          </a:p>
-          <a:p>
-            <a:r>
-              <a:rPr lang="en-US" baseline="0" dirty="0" smtClean="0"/>
-              <a:t>Example – instead of verbalizing it explicitly. (array index 0 equal null, array index 1 equal null and so on)</a:t>
-            </a:r>
-          </a:p>
-          <a:p>
-            <a:r>
-              <a:rPr lang="en-US" baseline="0" dirty="0" smtClean="0"/>
-              <a:t>[Q&amp;A only] Future – because high level code is quite ambiguous for computers to translate precisely. </a:t>
-            </a:r>
             <a:endParaRPr lang="en-US" dirty="0"/>
           </a:p>
         </p:txBody>
@@ -830,45 +776,6 @@
           <a:bodyPr/>
           <a:lstStyle/>
           <a:p>
-            <a:r>
-              <a:rPr lang="en-US" dirty="0" smtClean="0"/>
-              <a:t>[e.g.] English native speakers</a:t>
-            </a:r>
-            <a:r>
-              <a:rPr lang="en-US" baseline="0" dirty="0" smtClean="0"/>
-              <a:t> utilize pause to indicate grouping of terms in that expression to differentiate above cases. Array sub I &lt;pause&gt; plus </a:t>
-            </a:r>
-            <a:r>
-              <a:rPr lang="en-US" baseline="0" dirty="0" err="1" smtClean="0"/>
-              <a:t>plus</a:t>
-            </a:r>
-            <a:r>
-              <a:rPr lang="en-US" baseline="0" dirty="0" smtClean="0"/>
-              <a:t> </a:t>
-            </a:r>
-          </a:p>
-          <a:p>
-            <a:r>
-              <a:rPr lang="en-US" baseline="0" dirty="0" smtClean="0"/>
-              <a:t>Array sub &lt;pause&gt; I plus </a:t>
-            </a:r>
-            <a:r>
-              <a:rPr lang="en-US" baseline="0" dirty="0" err="1" smtClean="0"/>
-              <a:t>plus</a:t>
-            </a:r>
-            <a:endParaRPr lang="en-US" baseline="0" dirty="0" smtClean="0"/>
-          </a:p>
-          <a:p>
-            <a:r>
-              <a:rPr lang="en-US" baseline="0" dirty="0" smtClean="0"/>
-              <a:t>Non-native – use their own native language prosody when speaking English </a:t>
-            </a:r>
-            <a:r>
-              <a:rPr lang="en-US" baseline="0" dirty="0" smtClean="0">
-                <a:sym typeface="Wingdings" panose="05000000000000000000" pitchFamily="2" charset="2"/>
-              </a:rPr>
-              <a:t> change meaning of word</a:t>
-            </a:r>
             <a:endParaRPr lang="en-US" dirty="0"/>
           </a:p>
         </p:txBody>
@@ -953,49 +860,6 @@
           <a:bodyPr/>
           <a:lstStyle/>
           <a:p>
-            <a:r>
-              <a:rPr lang="en-US" dirty="0" smtClean="0"/>
-              <a:t>Harmonia handles – by using</a:t>
-            </a:r>
-            <a:r>
-              <a:rPr lang="en-US" baseline="0" dirty="0" smtClean="0"/>
-              <a:t> contextual info to perform disambiguation and choose the proper interpretations to translate Spoken Java into Java code.</a:t>
-            </a:r>
-          </a:p>
-          <a:p>
-            <a:pPr marL="0" marR="0" lvl="0" indent="0" algn="l" defTabSz="914400" rtl="0" eaLnBrk="1" fontAlgn="auto" latinLnBrk="0" hangingPunct="1">
-              <a:lnSpc>
-                <a:spcPct val="100000"/>
-              </a:lnSpc>
-              <a:spcBef>
-                <a:spcPts val="0"/>
-              </a:spcBef>
-              <a:spcAft>
-                <a:spcPts val="0"/>
-              </a:spcAft>
-              <a:buClrTx/>
-              <a:buSzTx/>
-              <a:buFontTx/>
-              <a:buNone/>
-              <a:tabLst/>
-              <a:defRPr/>
-            </a:pPr>
-            <a:r>
-              <a:rPr lang="en-US" baseline="0" dirty="0" smtClean="0"/>
-              <a:t>[Note only] </a:t>
-            </a:r>
-            <a:r>
-              <a:rPr lang="en-US" dirty="0" smtClean="0">
-                <a:solidFill>
-                  <a:srgbClr val="000000"/>
-                </a:solidFill>
-                <a:latin typeface="Times New Roman" panose="02020603050405020304" pitchFamily="18" charset="0"/>
-              </a:rPr>
-              <a:t>Spoken Java is also defined by a lexical specification which allows for different ways of verbalizations to match the same construct. </a:t>
-            </a:r>
-            <a:endParaRPr lang="en-US" dirty="0" smtClean="0"/>
-          </a:p>
-          <a:p>
             <a:endParaRPr lang="en-US" dirty="0"/>
           </a:p>
         </p:txBody>
@@ -1080,46 +944,6 @@
           <a:bodyPr/>
           <a:lstStyle/>
           <a:p>
-            <a:r>
-              <a:rPr lang="en-US" dirty="0" smtClean="0"/>
-              <a:t>Lack of feedback</a:t>
-            </a:r>
-            <a:r>
-              <a:rPr lang="en-US" baseline="0" dirty="0" smtClean="0"/>
-              <a:t> – programmers receive no feedback of their current state when verbalizing the code </a:t>
-            </a:r>
-            <a:r>
-              <a:rPr lang="en-US" baseline="0" dirty="0" smtClean="0">
-                <a:sym typeface="Wingdings" panose="05000000000000000000" pitchFamily="2" charset="2"/>
-              </a:rPr>
-              <a:t> know nothing about program correctness.  prevent them from understanding how programmers would verbally edit code.</a:t>
-            </a:r>
-          </a:p>
-          <a:p>
-            <a:r>
-              <a:rPr lang="en-US" baseline="0" dirty="0" smtClean="0">
-                <a:sym typeface="Wingdings" panose="05000000000000000000" pitchFamily="2" charset="2"/>
-              </a:rPr>
-              <a:t>Linear fashion – this is unlike how programmers will write code  where they might go front and back when writing code.</a:t>
-            </a:r>
-          </a:p>
-          <a:p>
-            <a:r>
-              <a:rPr lang="en-US" baseline="0" dirty="0" smtClean="0">
-                <a:sym typeface="Wingdings" panose="05000000000000000000" pitchFamily="2" charset="2"/>
-              </a:rPr>
-              <a:t>Diff programming styles – some prefer modular programming, some prefer planning interface first before writing code. All these styles require speech system and analysis of partial code, which is unsupported by Spoken Java.</a:t>
-            </a:r>
-          </a:p>
-          <a:p>
-            <a:r>
-              <a:rPr lang="en-US" baseline="0" dirty="0" smtClean="0">
-                <a:sym typeface="Wingdings" panose="05000000000000000000" pitchFamily="2" charset="2"/>
-              </a:rPr>
-              <a:t>Reading from script – coding involves writing code on the fly. This action of spontaneous voice-based coding can show us how programmers will edit or code in a non-linear manner. Begel study doesn’t do this and we do not know what kind of error and ambiguities will surface.</a:t>
-            </a:r>
-          </a:p>
-          <a:p>
             <a:endParaRPr lang="en-US" dirty="0"/>
           </a:p>
         </p:txBody>
@@ -1204,26 +1028,6 @@
           <a:bodyPr/>
           <a:lstStyle/>
           <a:p>
-            <a:r>
-              <a:rPr lang="en-US" dirty="0" smtClean="0"/>
-              <a:t>Eliminate</a:t>
-            </a:r>
-            <a:r>
-              <a:rPr lang="en-US" baseline="0" dirty="0" smtClean="0"/>
-              <a:t> ambiguity – programming language is precise, and we have to restrict what the user can say to achieve this</a:t>
-            </a:r>
-          </a:p>
-          <a:p>
-            <a:r>
-              <a:rPr lang="en-US" baseline="0" dirty="0" smtClean="0"/>
-              <a:t>Importance of feedback – so that programmer will know current progress and correctness of program</a:t>
-            </a:r>
-          </a:p>
-          <a:p>
-            <a:r>
-              <a:rPr lang="en-US" baseline="0" dirty="0" smtClean="0"/>
-              <a:t>Verbalize code – omit punctuations and ambiguity , so we need to have a more structured language to handle these cases</a:t>
-            </a:r>
             <a:endParaRPr lang="en-US" dirty="0"/>
           </a:p>
         </p:txBody>
@@ -1308,20 +1112,6 @@
           <a:bodyPr/>
           <a:lstStyle/>
           <a:p>
-            <a:r>
-              <a:rPr lang="en-US" dirty="0" smtClean="0"/>
-              <a:t>Structured language</a:t>
-            </a:r>
-            <a:r>
-              <a:rPr lang="en-US" baseline="0" dirty="0" smtClean="0"/>
-              <a:t> – Ambiguities like : different programmers might have more than one way of saying same code</a:t>
-            </a:r>
-          </a:p>
-          <a:p>
-            <a:r>
-              <a:rPr lang="en-US" baseline="0" dirty="0" smtClean="0"/>
-              <a:t>Please refer to given handout for structured language</a:t>
-            </a:r>
             <a:endParaRPr lang="en-US" dirty="0"/>
           </a:p>
         </p:txBody>
@@ -1406,118 +1196,6 @@
           <a:bodyPr/>
           <a:lstStyle/>
           <a:p>
-            <a:r>
-              <a:rPr lang="en-US" dirty="0" smtClean="0"/>
-              <a:t>After coming up</a:t>
-            </a:r>
-            <a:r>
-              <a:rPr lang="en-US" baseline="0" dirty="0" smtClean="0"/>
-              <a:t> with the first draft of my own structured language, I have picked out some of the keywords and conducted an experiment with 10 participants.</a:t>
-            </a:r>
-          </a:p>
-          <a:p>
-            <a:r>
-              <a:rPr lang="en-US" baseline="0" dirty="0" smtClean="0"/>
-              <a:t>They were asked to record their voice into an audio file which consists of the keywords, and then these audio files passed through my speech recognizer. </a:t>
-            </a:r>
-          </a:p>
-          <a:p>
-            <a:endParaRPr lang="en-US" baseline="0" dirty="0" smtClean="0"/>
-          </a:p>
-          <a:p>
-            <a:pPr marL="0" marR="0" lvl="0" indent="0" algn="l" defTabSz="914400" rtl="0" eaLnBrk="1" fontAlgn="auto" latinLnBrk="0" hangingPunct="1">
-              <a:lnSpc>
-                <a:spcPct val="100000"/>
-              </a:lnSpc>
-              <a:spcBef>
-                <a:spcPts val="0"/>
-              </a:spcBef>
-              <a:spcAft>
-                <a:spcPts val="0"/>
-              </a:spcAft>
-              <a:buClrTx/>
-              <a:buSzTx/>
-              <a:buFontTx/>
-              <a:buNone/>
-              <a:tabLst/>
-              <a:defRPr/>
-            </a:pPr>
-            <a:r>
-              <a:rPr lang="en-US" sz="1200" kern="1200" dirty="0" smtClean="0">
-                <a:solidFill>
-                  <a:schemeClr val="tx1"/>
-                </a:solidFill>
-                <a:effectLst/>
-                <a:latin typeface="+mn-lt"/>
-                <a:ea typeface="+mn-ea"/>
-                <a:cs typeface="+mn-cs"/>
-              </a:rPr>
-              <a:t>From the figure above, it can be noted that Google Cloud Speech API consistently performs better than the other two in most of the cases of keywords.</a:t>
-            </a:r>
-          </a:p>
-          <a:p>
-            <a:pPr marL="0" marR="0" lvl="0" indent="0" algn="l" defTabSz="914400" rtl="0" eaLnBrk="1" fontAlgn="auto" latinLnBrk="0" hangingPunct="1">
-              <a:lnSpc>
-                <a:spcPct val="100000"/>
-              </a:lnSpc>
-              <a:spcBef>
-                <a:spcPts val="0"/>
-              </a:spcBef>
-              <a:spcAft>
-                <a:spcPts val="0"/>
-              </a:spcAft>
-              <a:buClrTx/>
-              <a:buSzTx/>
-              <a:buFontTx/>
-              <a:buNone/>
-              <a:tabLst/>
-              <a:defRPr/>
-            </a:pPr>
-            <a:r>
-              <a:rPr lang="en-US" sz="1200" kern="1200" dirty="0" smtClean="0">
-                <a:solidFill>
-                  <a:schemeClr val="tx1"/>
-                </a:solidFill>
-                <a:effectLst/>
-                <a:latin typeface="+mn-lt"/>
-                <a:ea typeface="+mn-ea"/>
-                <a:cs typeface="+mn-cs"/>
-              </a:rPr>
-              <a:t>The difference between Google Speech Recognition and Google Cloud Speech API lies within the fact that the latter allows for a list of preferred phrases to be passed into the recognition process, which greatly enhances the accuracy of the speech recognition. </a:t>
-            </a:r>
-          </a:p>
-          <a:p>
-            <a:pPr marL="0" marR="0" lvl="0" indent="0" algn="l" defTabSz="914400" rtl="0" eaLnBrk="1" fontAlgn="auto" latinLnBrk="0" hangingPunct="1">
-              <a:lnSpc>
-                <a:spcPct val="100000"/>
-              </a:lnSpc>
-              <a:spcBef>
-                <a:spcPts val="0"/>
-              </a:spcBef>
-              <a:spcAft>
-                <a:spcPts val="0"/>
-              </a:spcAft>
-              <a:buClrTx/>
-              <a:buSzTx/>
-              <a:buFontTx/>
-              <a:buNone/>
-              <a:tabLst/>
-              <a:defRPr/>
-            </a:pPr>
-            <a:r>
-              <a:rPr lang="en-US" sz="1200" kern="1200" dirty="0" smtClean="0">
-                <a:solidFill>
-                  <a:schemeClr val="tx1"/>
-                </a:solidFill>
-                <a:effectLst/>
-                <a:latin typeface="+mn-lt"/>
-                <a:ea typeface="+mn-ea"/>
-                <a:cs typeface="+mn-cs"/>
-              </a:rPr>
-              <a:t>On the other hand, Microsoft Bing Voice Recognition seem to be only accurate for a few keywords and is largely inaccurate for most of the keywords involved.</a:t>
-            </a:r>
-          </a:p>
-          <a:p>
             <a:endParaRPr lang="en-US" dirty="0"/>
           </a:p>
         </p:txBody>
@@ -1602,128 +1280,6 @@
           <a:bodyPr/>
           <a:lstStyle/>
           <a:p>
-            <a:r>
-              <a:rPr lang="en-US" dirty="0" smtClean="0"/>
-              <a:t>Previous experiment focuses more on keywords</a:t>
-            </a:r>
-            <a:r>
-              <a:rPr lang="en-US" baseline="0" dirty="0" smtClean="0"/>
-              <a:t> as a starting point for our analysis.</a:t>
-            </a:r>
-          </a:p>
-          <a:p>
-            <a:r>
-              <a:rPr lang="en-US" baseline="0" dirty="0" smtClean="0"/>
-              <a:t>However, the actual recognition process would require user to speak in complete sentences. “declare integer count equal zero” and NOT “declare integer”</a:t>
-            </a:r>
-          </a:p>
-          <a:p>
-            <a:r>
-              <a:rPr lang="en-US" dirty="0" smtClean="0"/>
-              <a:t>So I</a:t>
-            </a:r>
-            <a:r>
-              <a:rPr lang="en-US" baseline="0" dirty="0" smtClean="0"/>
-              <a:t> conducted another experiment, in which a script for finding maximum number in integer array was written using my structured language, for the same 10 participants</a:t>
-            </a:r>
-          </a:p>
-          <a:p>
-            <a:endParaRPr lang="en-US" baseline="0" dirty="0" smtClean="0"/>
-          </a:p>
-          <a:p>
-            <a:pPr marL="0" marR="0" lvl="0" indent="0" algn="l" defTabSz="914400" rtl="0" eaLnBrk="1" fontAlgn="auto" latinLnBrk="0" hangingPunct="1">
-              <a:lnSpc>
-                <a:spcPct val="100000"/>
-              </a:lnSpc>
-              <a:spcBef>
-                <a:spcPts val="0"/>
-              </a:spcBef>
-              <a:spcAft>
-                <a:spcPts val="0"/>
-              </a:spcAft>
-              <a:buClrTx/>
-              <a:buSzTx/>
-              <a:buFontTx/>
-              <a:buNone/>
-              <a:tabLst/>
-              <a:defRPr/>
-            </a:pPr>
-            <a:r>
-              <a:rPr lang="en-US" sz="1200" kern="1200" dirty="0" smtClean="0">
-                <a:solidFill>
-                  <a:schemeClr val="tx1"/>
-                </a:solidFill>
-                <a:effectLst/>
-                <a:latin typeface="+mn-lt"/>
-                <a:ea typeface="+mn-ea"/>
-                <a:cs typeface="+mn-cs"/>
-              </a:rPr>
-              <a:t>The numbers above confirms Google Cloud Speech API produces the most accurate results over the other two APIs. </a:t>
-            </a:r>
-          </a:p>
-          <a:p>
-            <a:pPr marL="0" marR="0" lvl="0" indent="0" algn="l" defTabSz="914400" rtl="0" eaLnBrk="1" fontAlgn="auto" latinLnBrk="0" hangingPunct="1">
-              <a:lnSpc>
-                <a:spcPct val="100000"/>
-              </a:lnSpc>
-              <a:spcBef>
-                <a:spcPts val="0"/>
-              </a:spcBef>
-              <a:spcAft>
-                <a:spcPts val="0"/>
-              </a:spcAft>
-              <a:buClrTx/>
-              <a:buSzTx/>
-              <a:buFontTx/>
-              <a:buNone/>
-              <a:tabLst/>
-              <a:defRPr/>
-            </a:pPr>
-            <a:r>
-              <a:rPr lang="en-US" sz="1200" kern="1200" dirty="0" smtClean="0">
-                <a:solidFill>
-                  <a:schemeClr val="tx1"/>
-                </a:solidFill>
-                <a:effectLst/>
-                <a:latin typeface="+mn-lt"/>
-                <a:ea typeface="+mn-ea"/>
-                <a:cs typeface="+mn-cs"/>
-              </a:rPr>
-              <a:t>I have also observed from the raw data of the results that Microsoft Bing Voice Recognition is more suitable for recognizing proper complete English sentences than user-defined structured language. </a:t>
-            </a:r>
-          </a:p>
-          <a:p>
-            <a:pPr marL="0" marR="0" lvl="0" indent="0" algn="l" defTabSz="914400" rtl="0" eaLnBrk="1" fontAlgn="auto" latinLnBrk="0" hangingPunct="1">
-              <a:lnSpc>
-                <a:spcPct val="100000"/>
-              </a:lnSpc>
-              <a:spcBef>
-                <a:spcPts val="0"/>
-              </a:spcBef>
-              <a:spcAft>
-                <a:spcPts val="0"/>
-              </a:spcAft>
-              <a:buClrTx/>
-              <a:buSzTx/>
-              <a:buFontTx/>
-              <a:buNone/>
-              <a:tabLst/>
-              <a:defRPr/>
-            </a:pPr>
-            <a:r>
-              <a:rPr lang="en-US" sz="1200" kern="1200" dirty="0" smtClean="0">
-                <a:solidFill>
-                  <a:schemeClr val="tx1"/>
-                </a:solidFill>
-                <a:effectLst/>
-                <a:latin typeface="+mn-lt"/>
-                <a:ea typeface="+mn-ea"/>
-                <a:cs typeface="+mn-cs"/>
-              </a:rPr>
-              <a:t>As such, I have decided on the use of Google Cloud Speech API for my speech recognizer module.</a:t>
-            </a:r>
-          </a:p>
-          <a:p>
             <a:endParaRPr lang="en-US" dirty="0"/>
           </a:p>
         </p:txBody>
@@ -1808,14 +1364,6 @@
           <a:bodyPr/>
           <a:lstStyle/>
           <a:p>
-            <a:r>
-              <a:rPr lang="en-US" dirty="0" smtClean="0"/>
-              <a:t>Contextual info about previously</a:t>
-            </a:r>
-            <a:r>
-              <a:rPr lang="en-US" baseline="0" dirty="0" smtClean="0"/>
-              <a:t> declared variables in variable or function declaration statements.</a:t>
-            </a:r>
             <a:endParaRPr lang="en-US" dirty="0"/>
           </a:p>
         </p:txBody>
@@ -1900,26 +1448,6 @@
           <a:bodyPr/>
           <a:lstStyle/>
           <a:p>
-            <a:r>
-              <a:rPr lang="en-US" dirty="0" smtClean="0"/>
-              <a:t>Misinterpretations from speech recognizer.</a:t>
-            </a:r>
-          </a:p>
-          <a:p>
-            <a:r>
-              <a:rPr lang="en-US" dirty="0" smtClean="0"/>
-              <a:t>Example</a:t>
-            </a:r>
-            <a:r>
-              <a:rPr lang="en-US" baseline="0" dirty="0" smtClean="0"/>
-              <a:t> – attempt to correct “and” into “end” if the word “and” appended with the following word will form a valid end construct.</a:t>
-            </a:r>
-          </a:p>
-          <a:p>
-            <a:r>
-              <a:rPr lang="en-US" baseline="0" dirty="0" smtClean="0"/>
-              <a:t>Word Corrector module mainly targets the correction of keywords </a:t>
-            </a:r>
             <a:endParaRPr lang="en-US" dirty="0" smtClean="0"/>
           </a:p>
         </p:txBody>
@@ -2130,14 +1658,6 @@
           <a:bodyPr/>
           <a:lstStyle/>
           <a:p>
-            <a:r>
-              <a:rPr lang="en-US" dirty="0" smtClean="0"/>
-              <a:t>I will illustrate</a:t>
-            </a:r>
-            <a:r>
-              <a:rPr lang="en-US" baseline="0" dirty="0" smtClean="0"/>
-              <a:t> this correction with a simple example.</a:t>
-            </a:r>
             <a:endParaRPr lang="en-US" dirty="0"/>
           </a:p>
         </p:txBody>
@@ -2222,20 +1742,6 @@
           <a:bodyPr/>
           <a:lstStyle/>
           <a:p>
-            <a:r>
-              <a:rPr lang="en-US" dirty="0" smtClean="0"/>
-              <a:t>This is</a:t>
-            </a:r>
-            <a:r>
-              <a:rPr lang="en-US" baseline="0" dirty="0" smtClean="0"/>
-              <a:t> done with the aid of jellyfish python library, which does approximate and phonetic matching of strings.</a:t>
-            </a:r>
-          </a:p>
-          <a:p>
-            <a:r>
-              <a:rPr lang="en-US" baseline="0" dirty="0" smtClean="0"/>
-              <a:t>First, we will convert all the words into their phonetic encodings using American Soundex.</a:t>
-            </a:r>
             <a:endParaRPr lang="en-US" dirty="0"/>
           </a:p>
         </p:txBody>
@@ -2320,56 +1826,6 @@
           <a:bodyPr/>
           <a:lstStyle/>
           <a:p>
-            <a:r>
-              <a:rPr lang="en-US" dirty="0" smtClean="0"/>
-              <a:t>Then we will compare the resulting phonetic encodings with Jaro-Winkler Distance</a:t>
-            </a:r>
-          </a:p>
-          <a:p>
-            <a:r>
-              <a:rPr lang="en-US" dirty="0" smtClean="0"/>
-              <a:t>to get a similarity index between each</a:t>
-            </a:r>
-            <a:r>
-              <a:rPr lang="en-US" baseline="0" dirty="0" smtClean="0"/>
-              <a:t> pair of words. </a:t>
-            </a:r>
-          </a:p>
-          <a:p>
-            <a:r>
-              <a:rPr lang="en-US" baseline="0" dirty="0" smtClean="0"/>
-              <a:t>As the similarity index between “makes” and “max” is 0.85, which is the highest, “makes” will be replaced by “max”</a:t>
-            </a:r>
-          </a:p>
-          <a:p>
-            <a:r>
-              <a:rPr lang="en-US" baseline="0" dirty="0" smtClean="0"/>
-              <a:t>[Q&amp;A only] Jaro-Winkler distance: </a:t>
-            </a:r>
-            <a:r>
-              <a:rPr lang="en-US" sz="1200" b="0" i="0" u="none" strike="noStrike" kern="1200" dirty="0" smtClean="0">
-                <a:solidFill>
-                  <a:schemeClr val="tx1"/>
-                </a:solidFill>
-                <a:effectLst/>
-                <a:latin typeface="+mn-lt"/>
-                <a:ea typeface="+mn-ea"/>
-                <a:cs typeface="+mn-cs"/>
-              </a:rPr>
-              <a:t>string metric</a:t>
-            </a:r>
-            <a:r>
-              <a:rPr lang="en-US" sz="1200" b="0" i="0" kern="1200" dirty="0" smtClean="0">
-                <a:solidFill>
-                  <a:schemeClr val="tx1"/>
-                </a:solidFill>
-                <a:effectLst/>
-                <a:latin typeface="+mn-lt"/>
-                <a:ea typeface="+mn-ea"/>
-                <a:cs typeface="+mn-cs"/>
-              </a:rPr>
-              <a:t> for measuring the edit distance between two sequences. The Jaro distance between two words is the minimum number of single-character transpositions required to change one word into the other.]</a:t>
-            </a:r>
             <a:endParaRPr lang="en-US" dirty="0"/>
           </a:p>
         </p:txBody>
@@ -2454,26 +1910,12 @@
           <a:bodyPr/>
           <a:lstStyle/>
           <a:p>
-            <a:r>
-              <a:rPr lang="en-US" dirty="0" smtClean="0">
-                <a:solidFill>
-                  <a:srgbClr val="000000"/>
-                </a:solidFill>
-                <a:latin typeface="Times New Roman" panose="02020603050405020304" pitchFamily="18" charset="0"/>
-              </a:rPr>
-              <a:t> As the jellyfish python library provides more than just one way of doing phonetic encoding and string comparisons, there is a need to test which pair of algorithms deliver better results. </a:t>
-            </a:r>
-          </a:p>
-          <a:p>
-            <a:r>
-              <a:rPr lang="en-US" dirty="0" smtClean="0">
-                <a:solidFill>
-                  <a:srgbClr val="000000"/>
-                </a:solidFill>
-                <a:latin typeface="Times New Roman" panose="02020603050405020304" pitchFamily="18" charset="0"/>
-              </a:rPr>
-              <a:t>It is preferable to have differentiable similarity indices between different pair of words (i.e. no ties in similarity index). After much testing, I have found that American Soundex and Jaro-Winkler Distance are the best fit for this purpose. </a:t>
-            </a:r>
+            <a:endParaRPr lang="en-US" dirty="0" smtClean="0">
+              <a:solidFill>
+                <a:srgbClr val="000000"/>
+              </a:solidFill>
+              <a:latin typeface="Times New Roman" panose="02020603050405020304" pitchFamily="18" charset="0"/>
+            </a:endParaRPr>
           </a:p>
         </p:txBody>
       </p:sp>
@@ -2557,55 +1999,6 @@
           <a:bodyPr/>
           <a:lstStyle/>
           <a:p>
-            <a:r>
-              <a:rPr lang="en-US" dirty="0" smtClean="0">
-                <a:solidFill>
-                  <a:srgbClr val="000000"/>
-                </a:solidFill>
-                <a:latin typeface="Times New Roman" panose="02020603050405020304" pitchFamily="18" charset="0"/>
-              </a:rPr>
-              <a:t>The way which we use to find the closest matching pair of words is actually a heuristic and not an algorithm. This is due to the fact that it is difficult to truly tell which word is closer to a particular target word. </a:t>
-            </a:r>
-          </a:p>
-          <a:p>
-            <a:r>
-              <a:rPr lang="en-US" dirty="0" smtClean="0">
-                <a:solidFill>
-                  <a:srgbClr val="000000"/>
-                </a:solidFill>
-                <a:latin typeface="Times New Roman" panose="02020603050405020304" pitchFamily="18" charset="0"/>
-              </a:rPr>
-              <a:t>For instance, if we have already declared the variables “book”, “loot”, “could” and we need to correct the word “wood”, which of these 3 variables would we deem as closest matching to the word </a:t>
-            </a:r>
-            <a:r>
-              <a:rPr lang="en-US" dirty="0" smtClean="0">
-                <a:latin typeface="Times New Roman" panose="02020603050405020304" pitchFamily="18" charset="0"/>
-              </a:rPr>
-              <a:t>“wood”.  [FYI: program</a:t>
-            </a:r>
-            <a:r>
-              <a:rPr lang="en-US" baseline="0" dirty="0" smtClean="0">
-                <a:latin typeface="Times New Roman" panose="02020603050405020304" pitchFamily="18" charset="0"/>
-              </a:rPr>
-              <a:t> says loot]</a:t>
-            </a:r>
-            <a:endParaRPr lang="en-US" dirty="0" smtClean="0">
-              <a:latin typeface="Times New Roman" panose="02020603050405020304" pitchFamily="18" charset="0"/>
-            </a:endParaRPr>
-          </a:p>
-          <a:p>
-            <a:r>
-              <a:rPr lang="en-US" dirty="0" smtClean="0">
-                <a:latin typeface="Times New Roman" panose="02020603050405020304" pitchFamily="18" charset="0"/>
-              </a:rPr>
-              <a:t>However, this heuristic is good enough for the purposes of this program in most instances, after testing the program with our script for the sample program from our earlier experiment. </a:t>
-            </a:r>
-            <a:endParaRPr lang="en-US" dirty="0" smtClean="0"/>
-          </a:p>
-          <a:p>
-            <a:endParaRPr lang="en-US" dirty="0" smtClean="0"/>
-          </a:p>
-          <a:p>
             <a:endParaRPr lang="en-US" dirty="0"/>
           </a:p>
         </p:txBody>
@@ -2690,116 +2083,6 @@
           <a:bodyPr/>
           <a:lstStyle/>
           <a:p>
-            <a:r>
-              <a:rPr lang="en-US" sz="1200" b="0" i="0" u="none" strike="noStrike" kern="1200" baseline="0" dirty="0" smtClean="0">
-                <a:solidFill>
-                  <a:schemeClr val="tx1"/>
-                </a:solidFill>
-                <a:latin typeface="+mn-lt"/>
-                <a:ea typeface="+mn-ea"/>
-                <a:cs typeface="+mn-cs"/>
-              </a:rPr>
-              <a:t>user-defined grammar rules - our structured language in this case</a:t>
-            </a:r>
-          </a:p>
-          <a:p>
-            <a:r>
-              <a:rPr lang="en-US" sz="1200" b="0" i="0" u="none" strike="noStrike" kern="1200" baseline="0" dirty="0" smtClean="0">
-                <a:solidFill>
-                  <a:schemeClr val="tx1"/>
-                </a:solidFill>
-                <a:latin typeface="+mn-lt"/>
-                <a:ea typeface="+mn-ea"/>
-                <a:cs typeface="+mn-cs"/>
-              </a:rPr>
-              <a:t>allows easy editing of the structured language – definitely easier to change when necessary as compared to a hardcoded algorithm. </a:t>
-            </a:r>
-          </a:p>
-          <a:p>
-            <a:r>
-              <a:rPr lang="en-US" sz="1200" b="0" i="0" u="none" strike="noStrike" kern="1200" baseline="0" dirty="0" smtClean="0">
-                <a:solidFill>
-                  <a:schemeClr val="tx1"/>
-                </a:solidFill>
-                <a:latin typeface="+mn-lt"/>
-                <a:ea typeface="+mn-ea"/>
-                <a:cs typeface="+mn-cs"/>
-              </a:rPr>
-              <a:t>Context free grammar - We have also introduced the concept of context free grammar in defining our structured language’s grammar rules, after realizing that the initial set of language defined is not really properly designed and errors are not properly detected. With context free grammar, the grammar rules are now more well-defined and that new constructs or edits can be done more easily to the parser now. </a:t>
-            </a:r>
-          </a:p>
-          <a:p>
-            <a:r>
-              <a:rPr lang="en-US" sz="1200" b="0" i="0" u="none" strike="noStrike" kern="1200" baseline="0" dirty="0" smtClean="0">
-                <a:solidFill>
-                  <a:schemeClr val="tx1"/>
-                </a:solidFill>
-                <a:latin typeface="+mn-lt"/>
-                <a:ea typeface="+mn-ea"/>
-                <a:cs typeface="+mn-cs"/>
-              </a:rPr>
-              <a:t>[Q&amp;A] CFG - </a:t>
-            </a:r>
-            <a:r>
-              <a:rPr lang="en-US" sz="1200" b="0" i="0" kern="1200" dirty="0" smtClean="0">
-                <a:solidFill>
-                  <a:schemeClr val="tx1"/>
-                </a:solidFill>
-                <a:effectLst/>
-                <a:latin typeface="+mn-lt"/>
-                <a:ea typeface="+mn-ea"/>
-                <a:cs typeface="+mn-cs"/>
-              </a:rPr>
-              <a:t>a set of</a:t>
-            </a:r>
-            <a:r>
-              <a:rPr lang="en-US" sz="1200" b="0" i="0" kern="1200" baseline="0" dirty="0" smtClean="0">
-                <a:solidFill>
-                  <a:schemeClr val="tx1"/>
-                </a:solidFill>
-                <a:effectLst/>
-                <a:latin typeface="+mn-lt"/>
-                <a:ea typeface="+mn-ea"/>
-                <a:cs typeface="+mn-cs"/>
-              </a:rPr>
-              <a:t> production rules</a:t>
-            </a:r>
-            <a:r>
-              <a:rPr lang="en-US" sz="1200" b="0" i="0" kern="1200" dirty="0" smtClean="0">
-                <a:solidFill>
-                  <a:schemeClr val="tx1"/>
-                </a:solidFill>
-                <a:effectLst/>
-                <a:latin typeface="+mn-lt"/>
-                <a:ea typeface="+mn-ea"/>
-                <a:cs typeface="+mn-cs"/>
-              </a:rPr>
-              <a:t> that describe all possible strings in a given formal language. Production rules are simple replacements. In context-free grammars, all rules are one-to-one, one-to-many, or one-to-none. These rules can be applied regardless of context. The left-hand side of the production rule is always a</a:t>
-            </a:r>
-            <a:r>
-              <a:rPr lang="en-US" sz="1200" b="0" i="0" kern="1200" baseline="0" dirty="0" smtClean="0">
-                <a:solidFill>
-                  <a:schemeClr val="tx1"/>
-                </a:solidFill>
-                <a:effectLst/>
-                <a:latin typeface="+mn-lt"/>
-                <a:ea typeface="+mn-ea"/>
-                <a:cs typeface="+mn-cs"/>
-              </a:rPr>
-              <a:t> non-terminal</a:t>
-            </a:r>
-            <a:r>
-              <a:rPr lang="en-US" sz="1200" b="0" i="0" kern="1200" dirty="0" smtClean="0">
-                <a:solidFill>
-                  <a:schemeClr val="tx1"/>
-                </a:solidFill>
-                <a:effectLst/>
-                <a:latin typeface="+mn-lt"/>
-                <a:ea typeface="+mn-ea"/>
-                <a:cs typeface="+mn-cs"/>
-              </a:rPr>
-              <a:t> symbol. This means that the symbol does not appear in the resulting formal language. </a:t>
-            </a:r>
             <a:endParaRPr lang="en-US" dirty="0"/>
           </a:p>
         </p:txBody>
@@ -2884,66 +2167,6 @@
           <a:bodyPr/>
           <a:lstStyle/>
           <a:p>
-            <a:r>
-              <a:rPr lang="en-US" sz="1200" b="0" i="0" u="none" strike="noStrike" kern="1200" baseline="0" dirty="0" smtClean="0">
-                <a:solidFill>
-                  <a:schemeClr val="tx1"/>
-                </a:solidFill>
-                <a:latin typeface="+mn-lt"/>
-                <a:ea typeface="+mn-ea"/>
-                <a:cs typeface="+mn-cs"/>
-              </a:rPr>
-              <a:t>Let us look at an example of the function declaration construct using pyparsing and using context free grammar for our structured language.</a:t>
-            </a:r>
-          </a:p>
-          <a:p>
-            <a:r>
-              <a:rPr lang="en-US" sz="1200" b="0" i="0" u="none" strike="noStrike" kern="1200" baseline="0" dirty="0" smtClean="0">
-                <a:solidFill>
-                  <a:schemeClr val="tx1"/>
-                </a:solidFill>
-                <a:latin typeface="+mn-lt"/>
-                <a:ea typeface="+mn-ea"/>
-                <a:cs typeface="+mn-cs"/>
-              </a:rPr>
-              <a:t>Here we can see that this structured can be easily changed and it is properly defined from the start keyword to the ending keyword. </a:t>
-            </a:r>
-          </a:p>
-          <a:p>
-            <a:r>
-              <a:rPr lang="en-US" sz="1200" b="0" i="0" u="none" strike="noStrike" kern="1200" baseline="0" dirty="0" smtClean="0">
-                <a:solidFill>
-                  <a:schemeClr val="tx1"/>
-                </a:solidFill>
-                <a:latin typeface="+mn-lt"/>
-                <a:ea typeface="+mn-ea"/>
-                <a:cs typeface="+mn-cs"/>
-              </a:rPr>
-              <a:t>Any part of the construct can be replaced by some other keyword, and we can also add in extra keywords or remove some terms in the construct should the need arises. </a:t>
-            </a:r>
-          </a:p>
-          <a:p>
-            <a:endParaRPr lang="en-US" sz="1200" b="0" i="0" u="none" strike="noStrike" kern="1200" baseline="0" dirty="0" smtClean="0">
-              <a:solidFill>
-                <a:schemeClr val="tx1"/>
-              </a:solidFill>
-              <a:latin typeface="+mn-lt"/>
-              <a:ea typeface="+mn-ea"/>
-              <a:cs typeface="+mn-cs"/>
-            </a:endParaRPr>
-          </a:p>
-          <a:p>
-            <a:r>
-              <a:rPr lang="en-US" sz="1200" b="0" i="0" u="none" strike="noStrike" kern="1200" baseline="0" dirty="0" smtClean="0">
-                <a:solidFill>
-                  <a:schemeClr val="tx1"/>
-                </a:solidFill>
-                <a:latin typeface="+mn-lt"/>
-                <a:ea typeface="+mn-ea"/>
-                <a:cs typeface="+mn-cs"/>
-              </a:rPr>
-              <a:t>Animation – For example, lets say we want to replace the keyword from create function to begin function, we just have to replace it this way.</a:t>
-            </a:r>
             <a:endParaRPr lang="en-US" dirty="0"/>
           </a:p>
         </p:txBody>
@@ -3028,107 +2251,6 @@
           <a:bodyPr/>
           <a:lstStyle/>
           <a:p>
-            <a:r>
-              <a:rPr lang="en-US" dirty="0" smtClean="0"/>
-              <a:t>Previous</a:t>
-            </a:r>
-            <a:r>
-              <a:rPr lang="en-US" baseline="0" dirty="0" smtClean="0"/>
-              <a:t> project – titled Talk-to-Code: From Structured Command to Source Code.</a:t>
-            </a:r>
-          </a:p>
-          <a:p>
-            <a:r>
-              <a:rPr lang="en-US" baseline="0" dirty="0" smtClean="0"/>
-              <a:t>The program from previous project is able to convert the structured command into Abstracted Syntactical structure, which then constructs a compilable and runnable C program.</a:t>
-            </a:r>
-          </a:p>
-          <a:p>
-            <a:r>
-              <a:rPr lang="en-US" baseline="0" dirty="0" smtClean="0"/>
-              <a:t>This module completes our end-to-end program and generates C program code.</a:t>
-            </a:r>
-          </a:p>
-          <a:p>
-            <a:endParaRPr lang="en-US" baseline="0" dirty="0" smtClean="0"/>
-          </a:p>
-          <a:p>
-            <a:r>
-              <a:rPr lang="en-US" baseline="0" dirty="0" smtClean="0"/>
-              <a:t>[FYI] Abstract Syntax Tree - </a:t>
-            </a:r>
-            <a:r>
-              <a:rPr lang="en-US" sz="1200" b="0" i="0" kern="1200" dirty="0" smtClean="0">
-                <a:solidFill>
-                  <a:schemeClr val="tx1"/>
-                </a:solidFill>
-                <a:effectLst/>
-                <a:latin typeface="+mn-lt"/>
-                <a:ea typeface="+mn-ea"/>
-                <a:cs typeface="+mn-cs"/>
-              </a:rPr>
-              <a:t>is a </a:t>
-            </a:r>
-            <a:r>
-              <a:rPr lang="en-US" sz="1200" b="0" i="0" u="none" strike="noStrike" kern="1200" dirty="0" smtClean="0">
-                <a:solidFill>
-                  <a:schemeClr val="tx1"/>
-                </a:solidFill>
-                <a:effectLst/>
-                <a:latin typeface="+mn-lt"/>
-                <a:ea typeface="+mn-ea"/>
-                <a:cs typeface="+mn-cs"/>
-              </a:rPr>
-              <a:t>tree</a:t>
-            </a:r>
-            <a:r>
-              <a:rPr lang="en-US" sz="1200" b="0" i="0" u="none" strike="noStrike" kern="1200" baseline="0" dirty="0" smtClean="0">
-                <a:solidFill>
-                  <a:schemeClr val="tx1"/>
-                </a:solidFill>
-                <a:effectLst/>
-                <a:latin typeface="+mn-lt"/>
-                <a:ea typeface="+mn-ea"/>
-                <a:cs typeface="+mn-cs"/>
-              </a:rPr>
-              <a:t> </a:t>
-            </a:r>
-            <a:r>
-              <a:rPr lang="en-US" sz="1200" b="0" i="0" kern="1200" dirty="0" smtClean="0">
-                <a:solidFill>
-                  <a:schemeClr val="tx1"/>
-                </a:solidFill>
-                <a:effectLst/>
-                <a:latin typeface="+mn-lt"/>
-                <a:ea typeface="+mn-ea"/>
-                <a:cs typeface="+mn-cs"/>
-              </a:rPr>
-              <a:t>representation of the abstract syntactic</a:t>
-            </a:r>
-            <a:r>
-              <a:rPr lang="en-US" sz="1200" b="0" i="0" kern="1200" baseline="0" dirty="0" smtClean="0">
-                <a:solidFill>
-                  <a:schemeClr val="tx1"/>
-                </a:solidFill>
-                <a:effectLst/>
-                <a:latin typeface="+mn-lt"/>
-                <a:ea typeface="+mn-ea"/>
-                <a:cs typeface="+mn-cs"/>
-              </a:rPr>
-              <a:t> </a:t>
-            </a:r>
-            <a:r>
-              <a:rPr lang="en-US" sz="1200" b="0" i="0" kern="1200" dirty="0" smtClean="0">
-                <a:solidFill>
-                  <a:schemeClr val="tx1"/>
-                </a:solidFill>
-                <a:effectLst/>
-                <a:latin typeface="+mn-lt"/>
-                <a:ea typeface="+mn-ea"/>
-                <a:cs typeface="+mn-cs"/>
-              </a:rPr>
-              <a:t>structure of source code written in a programming language. Each node of the tree denotes a construct occurring in the source code.</a:t>
-            </a:r>
             <a:endParaRPr lang="en-US" dirty="0"/>
           </a:p>
         </p:txBody>
@@ -3213,57 +2335,6 @@
           <a:bodyPr/>
           <a:lstStyle/>
           <a:p>
-            <a:r>
-              <a:rPr lang="en-US" dirty="0" smtClean="0"/>
-              <a:t>Maybe show a simple demo then</a:t>
-            </a:r>
-            <a:r>
-              <a:rPr lang="en-US" baseline="0" dirty="0" smtClean="0"/>
-              <a:t> let the evaluator try the demo ?</a:t>
-            </a:r>
-          </a:p>
-          <a:p>
-            <a:endParaRPr lang="en-US" baseline="0" dirty="0" smtClean="0"/>
-          </a:p>
-          <a:p>
-            <a:r>
-              <a:rPr lang="en-US" dirty="0" smtClean="0"/>
-              <a:t>declare integer first equal one end declare</a:t>
-            </a:r>
-          </a:p>
-          <a:p>
-            <a:r>
-              <a:rPr lang="en-US" dirty="0" smtClean="0"/>
-              <a:t>Declare</a:t>
-            </a:r>
-            <a:r>
-              <a:rPr lang="en-US" baseline="0" dirty="0" smtClean="0"/>
-              <a:t> integer second equal two end declare</a:t>
-            </a:r>
-          </a:p>
-          <a:p>
-            <a:r>
-              <a:rPr lang="en-US" baseline="0" dirty="0" smtClean="0"/>
-              <a:t>Declare integer temporary equal first end declare</a:t>
-            </a:r>
-          </a:p>
-          <a:p>
-            <a:r>
-              <a:rPr lang="en-US" baseline="0" dirty="0" smtClean="0"/>
-              <a:t>First equal second end equal</a:t>
-            </a:r>
-          </a:p>
-          <a:p>
-            <a:r>
-              <a:rPr lang="en-US" baseline="0" dirty="0" smtClean="0"/>
-              <a:t>Second equal temporary end equal</a:t>
-            </a:r>
-          </a:p>
-          <a:p>
-            <a:r>
-              <a:rPr lang="en-US" dirty="0" smtClean="0"/>
-              <a:t> </a:t>
-            </a:r>
             <a:endParaRPr lang="en-US" dirty="0"/>
           </a:p>
         </p:txBody>
@@ -3348,66 +2419,6 @@
           <a:bodyPr/>
           <a:lstStyle/>
           <a:p>
-            <a:r>
-              <a:rPr lang="en-US" sz="1200" b="0" i="0" u="none" strike="noStrike" kern="1200" baseline="0" dirty="0" smtClean="0">
-                <a:solidFill>
-                  <a:schemeClr val="tx1"/>
-                </a:solidFill>
-                <a:latin typeface="+mn-lt"/>
-                <a:ea typeface="+mn-ea"/>
-                <a:cs typeface="+mn-cs"/>
-              </a:rPr>
-              <a:t>Point 1 – Continue to redefine and edit the structured language as the current structured language might be a little bit difficult to remember by heart and still lack some natural English language aspects.</a:t>
-            </a:r>
-          </a:p>
-          <a:p>
-            <a:r>
-              <a:rPr lang="en-US" sz="1200" b="0" i="0" u="none" strike="noStrike" kern="1200" baseline="0" dirty="0" smtClean="0">
-                <a:solidFill>
-                  <a:schemeClr val="tx1"/>
-                </a:solidFill>
-                <a:latin typeface="+mn-lt"/>
-                <a:ea typeface="+mn-ea"/>
-                <a:cs typeface="+mn-cs"/>
-              </a:rPr>
-              <a:t>Point 2 – This must be done while retaining the unambiguous domain of the language so that the translation to program code is not ambiguous. </a:t>
-            </a:r>
-          </a:p>
-          <a:p>
-            <a:r>
-              <a:rPr lang="en-US" sz="1200" b="0" i="0" u="none" strike="noStrike" kern="1200" baseline="0" dirty="0" smtClean="0">
-                <a:solidFill>
-                  <a:schemeClr val="tx1"/>
-                </a:solidFill>
-                <a:latin typeface="+mn-lt"/>
-                <a:ea typeface="+mn-ea"/>
-                <a:cs typeface="+mn-cs"/>
-              </a:rPr>
-              <a:t>Point 3 - There will also be attempts to improve the structured language to use keywords which can be more easily recognized by the Speech Recognition module to make the recognition process more accurate.  Example: “begin if” can be recognized while “if” is omitted most of the time.</a:t>
-            </a:r>
-          </a:p>
-          <a:p>
-            <a:endParaRPr lang="en-US" sz="1200" b="0" i="0" u="none" strike="noStrike" kern="1200" baseline="0" dirty="0" smtClean="0">
-              <a:solidFill>
-                <a:schemeClr val="tx1"/>
-              </a:solidFill>
-              <a:latin typeface="+mn-lt"/>
-              <a:ea typeface="+mn-ea"/>
-              <a:cs typeface="+mn-cs"/>
-            </a:endParaRPr>
-          </a:p>
-          <a:p>
-            <a:r>
-              <a:rPr lang="en-US" sz="1200" b="0" i="0" u="none" strike="noStrike" kern="1200" baseline="0" dirty="0" smtClean="0">
-                <a:solidFill>
-                  <a:schemeClr val="tx1"/>
-                </a:solidFill>
-                <a:latin typeface="+mn-lt"/>
-                <a:ea typeface="+mn-ea"/>
-                <a:cs typeface="+mn-cs"/>
-              </a:rPr>
-              <a:t>[Q&amp;A] natural English language aspects – spoken in a more natural English manner.</a:t>
-            </a:r>
             <a:endParaRPr lang="en-US" dirty="0"/>
           </a:p>
         </p:txBody>
@@ -3576,53 +2587,6 @@
           <a:bodyPr/>
           <a:lstStyle/>
           <a:p>
-            <a:r>
-              <a:rPr lang="en-US" sz="1200" b="0" i="0" u="none" strike="noStrike" kern="1200" baseline="0" dirty="0" smtClean="0">
-                <a:solidFill>
-                  <a:schemeClr val="tx1"/>
-                </a:solidFill>
-                <a:latin typeface="+mn-lt"/>
-                <a:ea typeface="+mn-ea"/>
-                <a:cs typeface="+mn-cs"/>
-              </a:rPr>
-              <a:t>The current structured language does not contain every programming construct available, and is restricted to only a limited set of constructs. The plan for the following semester would be to introduce more constructs to the program. Some of the constructs which were planned to be added includes… </a:t>
-            </a:r>
-          </a:p>
-          <a:p>
-            <a:r>
-              <a:rPr lang="en-US" sz="1200" b="0" i="0" u="none" strike="noStrike" kern="1200" baseline="0" dirty="0" smtClean="0">
-                <a:solidFill>
-                  <a:schemeClr val="tx1"/>
-                </a:solidFill>
-                <a:latin typeface="+mn-lt"/>
-                <a:ea typeface="+mn-ea"/>
-                <a:cs typeface="+mn-cs"/>
-              </a:rPr>
-              <a:t>[See points in slides]</a:t>
-            </a:r>
-          </a:p>
-          <a:p>
-            <a:endParaRPr lang="en-US" sz="1200" b="0" i="0" u="none" strike="noStrike" kern="1200" baseline="0" dirty="0" smtClean="0">
-              <a:solidFill>
-                <a:schemeClr val="tx1"/>
-              </a:solidFill>
-              <a:latin typeface="+mn-lt"/>
-              <a:ea typeface="+mn-ea"/>
-              <a:cs typeface="+mn-cs"/>
-            </a:endParaRPr>
-          </a:p>
-          <a:p>
-            <a:r>
-              <a:rPr lang="en-US" sz="1200" b="0" i="0" u="none" strike="noStrike" kern="1200" baseline="0" dirty="0" smtClean="0">
-                <a:solidFill>
-                  <a:schemeClr val="tx1"/>
-                </a:solidFill>
-                <a:latin typeface="+mn-lt"/>
-                <a:ea typeface="+mn-ea"/>
-                <a:cs typeface="+mn-cs"/>
-              </a:rPr>
-              <a:t>The sets of constructs to be added are not exhaustive. There will be many more other constructs which could be added as well, with the more commonly used constructs taking precedence in the order of my implementation in future. </a:t>
-            </a:r>
             <a:endParaRPr lang="en-US" dirty="0"/>
           </a:p>
         </p:txBody>
@@ -3707,76 +2671,6 @@
           <a:bodyPr/>
           <a:lstStyle/>
           <a:p>
-            <a:r>
-              <a:rPr lang="en-US" sz="1200" b="0" i="0" u="none" strike="noStrike" kern="1200" baseline="0" dirty="0" smtClean="0">
-                <a:solidFill>
-                  <a:schemeClr val="tx1"/>
-                </a:solidFill>
-                <a:latin typeface="+mn-lt"/>
-                <a:ea typeface="+mn-ea"/>
-                <a:cs typeface="+mn-cs"/>
-              </a:rPr>
-              <a:t>The Word Corrector module’s phase one currently uses a hardcoded algorithm to correct common errors, and this will change in the next semester. A hardcoded algorithm is not robust enough and is not easy for us to edit or make changes. </a:t>
-            </a:r>
-          </a:p>
-          <a:p>
-            <a:endParaRPr lang="en-US" sz="1200" b="0" i="0" u="none" strike="noStrike" kern="1200" baseline="0" dirty="0" smtClean="0">
-              <a:solidFill>
-                <a:schemeClr val="tx1"/>
-              </a:solidFill>
-              <a:latin typeface="+mn-lt"/>
-              <a:ea typeface="+mn-ea"/>
-              <a:cs typeface="+mn-cs"/>
-            </a:endParaRPr>
-          </a:p>
-          <a:p>
-            <a:r>
-              <a:rPr lang="en-US" sz="1200" b="0" i="0" u="none" strike="noStrike" kern="1200" baseline="0" dirty="0" smtClean="0">
-                <a:solidFill>
-                  <a:schemeClr val="tx1"/>
-                </a:solidFill>
-                <a:latin typeface="+mn-lt"/>
-                <a:ea typeface="+mn-ea"/>
-                <a:cs typeface="+mn-cs"/>
-              </a:rPr>
-              <a:t>One possible way would be to use the word similarity heuristic in Word Corrector module’s phase two to perform the correction.</a:t>
-            </a:r>
-          </a:p>
-          <a:p>
-            <a:r>
-              <a:rPr lang="en-US" sz="1200" b="0" i="0" u="none" strike="noStrike" kern="1200" baseline="0" dirty="0" smtClean="0">
-                <a:solidFill>
-                  <a:schemeClr val="tx1"/>
-                </a:solidFill>
-                <a:latin typeface="+mn-lt"/>
-                <a:ea typeface="+mn-ea"/>
-                <a:cs typeface="+mn-cs"/>
-              </a:rPr>
-              <a:t>We could possibly use a list of keywords and check if the recognized word from the Speech Recognition module has a close similarity to any of the keywords in the list and perform the correction.</a:t>
-            </a:r>
-          </a:p>
-          <a:p>
-            <a:endParaRPr lang="en-US" sz="1200" b="0" i="0" u="none" strike="noStrike" kern="1200" baseline="0" dirty="0" smtClean="0">
-              <a:solidFill>
-                <a:schemeClr val="tx1"/>
-              </a:solidFill>
-              <a:latin typeface="+mn-lt"/>
-              <a:ea typeface="+mn-ea"/>
-              <a:cs typeface="+mn-cs"/>
-            </a:endParaRPr>
-          </a:p>
-          <a:p>
-            <a:r>
-              <a:rPr lang="en-US" sz="1200" b="0" i="0" u="none" strike="noStrike" kern="1200" baseline="0" dirty="0" smtClean="0">
-                <a:solidFill>
-                  <a:schemeClr val="tx1"/>
-                </a:solidFill>
-                <a:latin typeface="+mn-lt"/>
-                <a:ea typeface="+mn-ea"/>
-                <a:cs typeface="+mn-cs"/>
-              </a:rPr>
-              <a:t>In the next semester, I will look at the plausibility of employing such a method to perform the correction and also investigate and research for more alternative methods to improve the correction, to check if there is any better way of doing the correction. </a:t>
-            </a:r>
             <a:endParaRPr lang="en-US" dirty="0"/>
           </a:p>
         </p:txBody>
@@ -3861,20 +2755,6 @@
           <a:bodyPr/>
           <a:lstStyle/>
           <a:p>
-            <a:r>
-              <a:rPr lang="en-US" dirty="0" smtClean="0"/>
-              <a:t>Explain</a:t>
-            </a:r>
-            <a:r>
-              <a:rPr lang="en-US" baseline="0" dirty="0" smtClean="0"/>
-              <a:t> GUI</a:t>
-            </a:r>
-          </a:p>
-          <a:p>
-            <a:r>
-              <a:rPr lang="en-US" baseline="0" dirty="0" smtClean="0"/>
-              <a:t>Keeps reading voice input – the final program will keep reading voice input and the user doesn’t have to keep typing to accept or reject what the program recognizes. This program will accept whatever the user says unless the user says undo or click on undo</a:t>
-            </a:r>
             <a:endParaRPr lang="en-US" dirty="0"/>
           </a:p>
         </p:txBody>
@@ -3959,34 +2839,6 @@
           <a:bodyPr/>
           <a:lstStyle/>
           <a:p>
-            <a:r>
-              <a:rPr lang="en-US" dirty="0" smtClean="0"/>
-              <a:t>Steep learning curve</a:t>
-            </a:r>
-            <a:r>
-              <a:rPr lang="en-US" baseline="0" dirty="0" smtClean="0"/>
-              <a:t> – hard to remember , take lots of time to issue correct command for code.</a:t>
-            </a:r>
-          </a:p>
-          <a:p>
-            <a:r>
-              <a:rPr lang="en-US" baseline="0" dirty="0" smtClean="0"/>
-              <a:t>Low productivity – additional time to learn new language or look at reference sheet. </a:t>
-            </a:r>
-            <a:r>
-              <a:rPr lang="en-US" baseline="0" dirty="0" smtClean="0">
-                <a:sym typeface="Wingdings" panose="05000000000000000000" pitchFamily="2" charset="2"/>
-              </a:rPr>
-              <a:t> time better spent doing something more productive</a:t>
-            </a:r>
-          </a:p>
-          <a:p>
-            <a:r>
-              <a:rPr lang="en-US" baseline="0" dirty="0" smtClean="0">
-                <a:sym typeface="Wingdings" panose="05000000000000000000" pitchFamily="2" charset="2"/>
-              </a:rPr>
-              <a:t>Learning point – easier to remember and smoothen the learning curve.</a:t>
-            </a:r>
             <a:endParaRPr lang="en-US" dirty="0"/>
           </a:p>
         </p:txBody>
@@ -4071,31 +2923,6 @@
           <a:bodyPr/>
           <a:lstStyle/>
           <a:p>
-            <a:r>
-              <a:rPr lang="en-US" dirty="0" smtClean="0"/>
-              <a:t>According to Begel’s research before he develop the Spoken Java program, he found …</a:t>
-            </a:r>
-          </a:p>
-          <a:p>
-            <a:r>
-              <a:rPr lang="en-US" dirty="0" smtClean="0"/>
-              <a:t>Example for</a:t>
-            </a:r>
-            <a:r>
-              <a:rPr lang="en-US" baseline="0" dirty="0" smtClean="0"/>
-              <a:t> homophones ( I vs eye, to vs two)</a:t>
-            </a:r>
-            <a:endParaRPr lang="en-US" dirty="0" smtClean="0"/>
-          </a:p>
-          <a:p>
-            <a:r>
-              <a:rPr lang="en-US" dirty="0" smtClean="0"/>
-              <a:t>Difficult to interpret</a:t>
-            </a:r>
-            <a:r>
-              <a:rPr lang="en-US" baseline="0" dirty="0" smtClean="0"/>
-              <a:t> by computers.</a:t>
-            </a:r>
             <a:endParaRPr lang="en-US" dirty="0"/>
           </a:p>
         </p:txBody>
@@ -4180,20 +3007,6 @@
           <a:bodyPr/>
           <a:lstStyle/>
           <a:p>
-            <a:r>
-              <a:rPr lang="en-US" dirty="0" smtClean="0"/>
-              <a:t>Required to be precise</a:t>
-            </a:r>
-            <a:r>
-              <a:rPr lang="en-US" baseline="0" dirty="0" smtClean="0"/>
-              <a:t> – so that compiling and running of the program code can be very efficient and feasible in implementation.</a:t>
-            </a:r>
-          </a:p>
-          <a:p>
-            <a:r>
-              <a:rPr lang="en-US" baseline="0" dirty="0" smtClean="0"/>
-              <a:t>Therefore, difficult to translate speech into programming languages as speech is ambiguous while programming languages cannot afford to be ambiguous.</a:t>
-            </a:r>
             <a:endParaRPr lang="en-US" dirty="0"/>
           </a:p>
         </p:txBody>
@@ -4278,20 +3091,6 @@
           <a:bodyPr/>
           <a:lstStyle/>
           <a:p>
-            <a:r>
-              <a:rPr lang="en-US" dirty="0" smtClean="0"/>
-              <a:t>Programming tasks such</a:t>
-            </a:r>
-            <a:r>
-              <a:rPr lang="en-US" baseline="0" dirty="0" smtClean="0"/>
-              <a:t> as create, edit, navigate through programs.</a:t>
-            </a:r>
-          </a:p>
-          <a:p>
-            <a:r>
-              <a:rPr lang="en-US" baseline="0" dirty="0" smtClean="0"/>
-              <a:t>Thus, speech tools not suited for programming.</a:t>
-            </a:r>
             <a:endParaRPr lang="en-US" dirty="0"/>
           </a:p>
         </p:txBody>
@@ -4460,25 +3259,6 @@
           <a:bodyPr/>
           <a:lstStyle/>
           <a:p>
-            <a:r>
-              <a:rPr lang="en-US" dirty="0" smtClean="0"/>
-              <a:t>Conduct</a:t>
-            </a:r>
-            <a:r>
-              <a:rPr lang="en-US" baseline="0" dirty="0" smtClean="0"/>
-              <a:t> an experiment with 10 expert programmers to read java code. Points found out…</a:t>
-            </a:r>
-            <a:endParaRPr lang="en-US" dirty="0" smtClean="0"/>
-          </a:p>
-          <a:p>
-            <a:r>
-              <a:rPr lang="en-US" dirty="0" smtClean="0"/>
-              <a:t>Capitalization</a:t>
-            </a:r>
-            <a:r>
-              <a:rPr lang="en-US" baseline="0" dirty="0" smtClean="0"/>
-              <a:t> not verbalized – problems as many programming languages are case sensitive.</a:t>
-            </a:r>
             <a:endParaRPr lang="en-US" dirty="0"/>
           </a:p>
         </p:txBody>
@@ -18450,24 +17230,40 @@
           <a:p>
             <a:pPr lvl="1"/>
             <a:r>
-              <a:rPr lang="en-US" sz="2600" dirty="0" smtClean="0"/>
+              <a:rPr lang="en-US" sz="2600" dirty="0" smtClean="0">
+                <a:solidFill>
+                  <a:schemeClr val="tx1"/>
+                </a:solidFill>
+              </a:rPr>
               <a:t>A little bit difficult to remember</a:t>
             </a:r>
           </a:p>
           <a:p>
             <a:pPr lvl="1"/>
             <a:r>
-              <a:rPr lang="en-US" sz="2600" dirty="0" smtClean="0"/>
+              <a:rPr lang="en-US" sz="2600" dirty="0" smtClean="0">
+                <a:solidFill>
+                  <a:schemeClr val="tx1"/>
+                </a:solidFill>
+              </a:rPr>
               <a:t>While retaining unambiguous domain</a:t>
             </a:r>
           </a:p>
           <a:p>
             <a:pPr lvl="1"/>
             <a:r>
-              <a:rPr lang="en-US" sz="2600" dirty="0" smtClean="0"/>
+              <a:rPr lang="en-US" sz="2600" dirty="0" smtClean="0">
+                <a:solidFill>
+                  <a:schemeClr val="tx1"/>
+                </a:solidFill>
+              </a:rPr>
               <a:t>Use keywords recognized more easily</a:t>
             </a:r>
-            <a:endParaRPr lang="en-US" sz="2600" dirty="0"/>
+            <a:endParaRPr lang="en-US" sz="2600" dirty="0">
+              <a:solidFill>
+                <a:schemeClr val="tx1"/>
+              </a:solidFill>
+            </a:endParaRPr>
           </a:p>
         </p:txBody>
       </p:sp>
@@ -18554,40 +17350,72 @@
           <a:p>
             <a:pPr lvl="1"/>
             <a:r>
-              <a:rPr lang="en-US" sz="2600" dirty="0" smtClean="0"/>
+              <a:rPr lang="en-US" sz="2600" dirty="0" smtClean="0">
+                <a:solidFill>
+                  <a:schemeClr val="tx1"/>
+                </a:solidFill>
+              </a:rPr>
               <a:t>Switch statement (switch – case construct)</a:t>
             </a:r>
-            <a:endParaRPr lang="en-US" sz="2600" dirty="0"/>
+            <a:endParaRPr lang="en-US" sz="2600" dirty="0">
+              <a:solidFill>
+                <a:schemeClr val="tx1"/>
+              </a:solidFill>
+            </a:endParaRPr>
           </a:p>
           <a:p>
             <a:pPr lvl="1"/>
             <a:r>
-              <a:rPr lang="en-US" sz="2600" dirty="0" smtClean="0"/>
+              <a:rPr lang="en-US" sz="2600" dirty="0" smtClean="0">
+                <a:solidFill>
+                  <a:schemeClr val="tx1"/>
+                </a:solidFill>
+              </a:rPr>
               <a:t>Logical “and”, logical “or” for comparison statements</a:t>
             </a:r>
           </a:p>
           <a:p>
             <a:pPr lvl="1"/>
             <a:r>
-              <a:rPr lang="en-US" sz="2600" dirty="0" smtClean="0"/>
+              <a:rPr lang="en-US" sz="2600" dirty="0" smtClean="0">
+                <a:solidFill>
+                  <a:schemeClr val="tx1"/>
+                </a:solidFill>
+              </a:rPr>
               <a:t>Shorthand assignment operators (i.e. += , *= )</a:t>
             </a:r>
-            <a:endParaRPr lang="en-US" sz="2600" dirty="0"/>
+            <a:endParaRPr lang="en-US" sz="2600" dirty="0">
+              <a:solidFill>
+                <a:schemeClr val="tx1"/>
+              </a:solidFill>
+            </a:endParaRPr>
           </a:p>
           <a:p>
             <a:pPr lvl="1"/>
             <a:r>
-              <a:rPr lang="en-US" sz="2600" dirty="0" smtClean="0"/>
+              <a:rPr lang="en-US" sz="2600" dirty="0" smtClean="0">
+                <a:solidFill>
+                  <a:schemeClr val="tx1"/>
+                </a:solidFill>
+              </a:rPr>
               <a:t>Allowing symbols like percentage (%), dollar ($), ampersand (&amp;)</a:t>
             </a:r>
           </a:p>
           <a:p>
             <a:pPr lvl="1"/>
             <a:r>
-              <a:rPr lang="en-US" sz="2600" dirty="0" smtClean="0"/>
+              <a:rPr lang="en-US" sz="2600" dirty="0" smtClean="0">
+                <a:solidFill>
+                  <a:schemeClr val="tx1"/>
+                </a:solidFill>
+              </a:rPr>
               <a:t>Many more…</a:t>
             </a:r>
-            <a:endParaRPr lang="en-US" sz="2600" dirty="0"/>
+            <a:endParaRPr lang="en-US" sz="2600" dirty="0">
+              <a:solidFill>
+                <a:schemeClr val="tx1"/>
+              </a:solidFill>
+            </a:endParaRPr>
           </a:p>
           <a:p>
             <a:endParaRPr lang="en-US" dirty="0"/>
@@ -18677,25 +17505,45 @@
           <a:p>
             <a:pPr lvl="1"/>
             <a:r>
-              <a:rPr lang="en-US" sz="2600" dirty="0" smtClean="0"/>
+              <a:rPr lang="en-US" sz="2600" dirty="0" smtClean="0">
+                <a:solidFill>
+                  <a:schemeClr val="tx1"/>
+                </a:solidFill>
+              </a:rPr>
               <a:t>Phase 1 correction currently uses hardcoded algorithm</a:t>
             </a:r>
-            <a:endParaRPr lang="en-US" dirty="0" smtClean="0"/>
+            <a:endParaRPr lang="en-US" dirty="0" smtClean="0">
+              <a:solidFill>
+                <a:schemeClr val="tx1"/>
+              </a:solidFill>
+            </a:endParaRPr>
           </a:p>
           <a:p>
             <a:pPr lvl="1"/>
             <a:r>
-              <a:rPr lang="en-US" sz="2600" dirty="0" smtClean="0"/>
+              <a:rPr lang="en-US" sz="2600" dirty="0" smtClean="0">
+                <a:solidFill>
+                  <a:schemeClr val="tx1"/>
+                </a:solidFill>
+              </a:rPr>
               <a:t>One possible way: Use word similarity heuristic in Word Corrector module phase 2</a:t>
             </a:r>
           </a:p>
           <a:p>
             <a:pPr lvl="1"/>
             <a:r>
-              <a:rPr lang="en-US" sz="2600" dirty="0" smtClean="0"/>
+              <a:rPr lang="en-US" sz="2600" dirty="0" smtClean="0">
+                <a:solidFill>
+                  <a:schemeClr val="tx1"/>
+                </a:solidFill>
+              </a:rPr>
               <a:t>Look at the plausibility of such method and find alternative methods if necessary</a:t>
             </a:r>
-            <a:endParaRPr lang="en-US" sz="2600" dirty="0"/>
+            <a:endParaRPr lang="en-US" sz="2600" dirty="0">
+              <a:solidFill>
+                <a:schemeClr val="tx1"/>
+              </a:solidFill>
+            </a:endParaRPr>
           </a:p>
         </p:txBody>
       </p:sp>
@@ -18946,17 +17794,29 @@
           <a:p>
             <a:pPr lvl="1"/>
             <a:r>
-              <a:rPr lang="en-US" sz="2600" dirty="0" smtClean="0"/>
+              <a:rPr lang="en-US" sz="2600" dirty="0" smtClean="0">
+                <a:solidFill>
+                  <a:schemeClr val="tx1"/>
+                </a:solidFill>
+              </a:rPr>
               <a:t>Develop a GUI</a:t>
             </a:r>
           </a:p>
           <a:p>
             <a:pPr lvl="1"/>
             <a:r>
-              <a:rPr lang="en-US" sz="2600" dirty="0" smtClean="0"/>
+              <a:rPr lang="en-US" sz="2600" dirty="0" smtClean="0">
+                <a:solidFill>
+                  <a:schemeClr val="tx1"/>
+                </a:solidFill>
+              </a:rPr>
               <a:t>Keeps reading voice input</a:t>
             </a:r>
-            <a:endParaRPr lang="en-US" sz="2600" dirty="0"/>
+            <a:endParaRPr lang="en-US" sz="2600" dirty="0">
+              <a:solidFill>
+                <a:schemeClr val="tx1"/>
+              </a:solidFill>
+            </a:endParaRPr>
           </a:p>
         </p:txBody>
       </p:sp>

</xml_diff>